<commit_message>
Added typings and pushed 0.0.4 version
</commit_message>
<xml_diff>
--- a/docs/Modes.pptx
+++ b/docs/Modes.pptx
@@ -5,7 +5,12 @@
     <p:sldMasterId id="2147483648" r:id="rId1"/>
   </p:sldMasterIdLst>
   <p:sldIdLst>
-    <p:sldId id="256" r:id="rId2"/>
+    <p:sldId id="258" r:id="rId2"/>
+    <p:sldId id="257" r:id="rId3"/>
+    <p:sldId id="259" r:id="rId4"/>
+    <p:sldId id="260" r:id="rId5"/>
+    <p:sldId id="261" r:id="rId6"/>
+    <p:sldId id="256" r:id="rId7"/>
   </p:sldIdLst>
   <p:sldSz cx="12192000" cy="6858000"/>
   <p:notesSz cx="6858000" cy="9144000"/>
@@ -104,6 +109,11 @@
       </a:defRPr>
     </a:lvl9pPr>
   </p:defaultTextStyle>
+  <p:extLst>
+    <p:ext uri="{EFAFB233-063F-42B5-8137-9DF3F51BA10A}">
+      <p15:sldGuideLst xmlns:p15="http://schemas.microsoft.com/office/powerpoint/2012/main"/>
+    </p:ext>
+  </p:extLst>
 </p:presentation>
 </file>
 
@@ -254,7 +264,7 @@
           <a:p>
             <a:fld id="{B1D224DC-7A03-894A-9BE6-0422F4EAB7F2}" type="datetimeFigureOut">
               <a:rPr lang="en-US" smtClean="0"/>
-              <a:t>10/3/20</a:t>
+              <a:t>10/6/20</a:t>
             </a:fld>
             <a:endParaRPr lang="en-US"/>
           </a:p>
@@ -452,7 +462,7 @@
           <a:p>
             <a:fld id="{B1D224DC-7A03-894A-9BE6-0422F4EAB7F2}" type="datetimeFigureOut">
               <a:rPr lang="en-US" smtClean="0"/>
-              <a:t>10/3/20</a:t>
+              <a:t>10/6/20</a:t>
             </a:fld>
             <a:endParaRPr lang="en-US"/>
           </a:p>
@@ -660,7 +670,7 @@
           <a:p>
             <a:fld id="{B1D224DC-7A03-894A-9BE6-0422F4EAB7F2}" type="datetimeFigureOut">
               <a:rPr lang="en-US" smtClean="0"/>
-              <a:t>10/3/20</a:t>
+              <a:t>10/6/20</a:t>
             </a:fld>
             <a:endParaRPr lang="en-US"/>
           </a:p>
@@ -858,7 +868,7 @@
           <a:p>
             <a:fld id="{B1D224DC-7A03-894A-9BE6-0422F4EAB7F2}" type="datetimeFigureOut">
               <a:rPr lang="en-US" smtClean="0"/>
-              <a:t>10/3/20</a:t>
+              <a:t>10/6/20</a:t>
             </a:fld>
             <a:endParaRPr lang="en-US"/>
           </a:p>
@@ -1133,7 +1143,7 @@
           <a:p>
             <a:fld id="{B1D224DC-7A03-894A-9BE6-0422F4EAB7F2}" type="datetimeFigureOut">
               <a:rPr lang="en-US" smtClean="0"/>
-              <a:t>10/3/20</a:t>
+              <a:t>10/6/20</a:t>
             </a:fld>
             <a:endParaRPr lang="en-US"/>
           </a:p>
@@ -1398,7 +1408,7 @@
           <a:p>
             <a:fld id="{B1D224DC-7A03-894A-9BE6-0422F4EAB7F2}" type="datetimeFigureOut">
               <a:rPr lang="en-US" smtClean="0"/>
-              <a:t>10/3/20</a:t>
+              <a:t>10/6/20</a:t>
             </a:fld>
             <a:endParaRPr lang="en-US"/>
           </a:p>
@@ -1810,7 +1820,7 @@
           <a:p>
             <a:fld id="{B1D224DC-7A03-894A-9BE6-0422F4EAB7F2}" type="datetimeFigureOut">
               <a:rPr lang="en-US" smtClean="0"/>
-              <a:t>10/3/20</a:t>
+              <a:t>10/6/20</a:t>
             </a:fld>
             <a:endParaRPr lang="en-US"/>
           </a:p>
@@ -1951,7 +1961,7 @@
           <a:p>
             <a:fld id="{B1D224DC-7A03-894A-9BE6-0422F4EAB7F2}" type="datetimeFigureOut">
               <a:rPr lang="en-US" smtClean="0"/>
-              <a:t>10/3/20</a:t>
+              <a:t>10/6/20</a:t>
             </a:fld>
             <a:endParaRPr lang="en-US"/>
           </a:p>
@@ -2064,7 +2074,7 @@
           <a:p>
             <a:fld id="{B1D224DC-7A03-894A-9BE6-0422F4EAB7F2}" type="datetimeFigureOut">
               <a:rPr lang="en-US" smtClean="0"/>
-              <a:t>10/3/20</a:t>
+              <a:t>10/6/20</a:t>
             </a:fld>
             <a:endParaRPr lang="en-US"/>
           </a:p>
@@ -2375,7 +2385,7 @@
           <a:p>
             <a:fld id="{B1D224DC-7A03-894A-9BE6-0422F4EAB7F2}" type="datetimeFigureOut">
               <a:rPr lang="en-US" smtClean="0"/>
-              <a:t>10/3/20</a:t>
+              <a:t>10/6/20</a:t>
             </a:fld>
             <a:endParaRPr lang="en-US"/>
           </a:p>
@@ -2663,7 +2673,7 @@
           <a:p>
             <a:fld id="{B1D224DC-7A03-894A-9BE6-0422F4EAB7F2}" type="datetimeFigureOut">
               <a:rPr lang="en-US" smtClean="0"/>
-              <a:t>10/3/20</a:t>
+              <a:t>10/6/20</a:t>
             </a:fld>
             <a:endParaRPr lang="en-US"/>
           </a:p>
@@ -2904,7 +2914,7 @@
           <a:p>
             <a:fld id="{B1D224DC-7A03-894A-9BE6-0422F4EAB7F2}" type="datetimeFigureOut">
               <a:rPr lang="en-US" smtClean="0"/>
-              <a:t>10/3/20</a:t>
+              <a:t>10/6/20</a:t>
             </a:fld>
             <a:endParaRPr lang="en-US"/>
           </a:p>
@@ -3323,6 +3333,1765 @@
       </p:grpSpPr>
       <p:sp>
         <p:nvSpPr>
+          <p:cNvPr id="2" name="Title 1">
+            <a:extLst>
+              <a:ext uri="{FF2B5EF4-FFF2-40B4-BE49-F238E27FC236}">
+                <a16:creationId xmlns:a16="http://schemas.microsoft.com/office/drawing/2014/main" id="{DFF2E70F-9ED9-1F47-A517-F3C489553E8D}"/>
+              </a:ext>
+            </a:extLst>
+          </p:cNvPr>
+          <p:cNvSpPr>
+            <a:spLocks noGrp="1"/>
+          </p:cNvSpPr>
+          <p:nvPr>
+            <p:ph type="ctrTitle"/>
+          </p:nvPr>
+        </p:nvSpPr>
+        <p:spPr/>
+        <p:txBody>
+          <a:bodyPr/>
+          <a:lstStyle/>
+          <a:p>
+            <a:r>
+              <a:rPr lang="en-US" dirty="0"/>
+              <a:t>Queue’s In Postgres</a:t>
+            </a:r>
+          </a:p>
+        </p:txBody>
+      </p:sp>
+      <p:sp>
+        <p:nvSpPr>
+          <p:cNvPr id="3" name="Subtitle 2">
+            <a:extLst>
+              <a:ext uri="{FF2B5EF4-FFF2-40B4-BE49-F238E27FC236}">
+                <a16:creationId xmlns:a16="http://schemas.microsoft.com/office/drawing/2014/main" id="{CF101DD1-E972-B141-8612-BAF604794FB9}"/>
+              </a:ext>
+            </a:extLst>
+          </p:cNvPr>
+          <p:cNvSpPr>
+            <a:spLocks noGrp="1"/>
+          </p:cNvSpPr>
+          <p:nvPr>
+            <p:ph type="subTitle" idx="1"/>
+          </p:nvPr>
+        </p:nvSpPr>
+        <p:spPr/>
+        <p:txBody>
+          <a:bodyPr/>
+          <a:lstStyle/>
+          <a:p>
+            <a:endParaRPr lang="en-US" dirty="0"/>
+          </a:p>
+        </p:txBody>
+      </p:sp>
+    </p:spTree>
+    <p:extLst>
+      <p:ext uri="{BB962C8B-B14F-4D97-AF65-F5344CB8AC3E}">
+        <p14:creationId xmlns:p14="http://schemas.microsoft.com/office/powerpoint/2010/main" val="1280083977"/>
+      </p:ext>
+    </p:extLst>
+  </p:cSld>
+  <p:clrMapOvr>
+    <a:masterClrMapping/>
+  </p:clrMapOvr>
+</p:sld>
+</file>
+
+<file path=ppt/slides/slide2.xml><?xml version="1.0" encoding="utf-8"?>
+<p:sld xmlns:a="http://schemas.openxmlformats.org/drawingml/2006/main" xmlns:r="http://schemas.openxmlformats.org/officeDocument/2006/relationships" xmlns:p="http://schemas.openxmlformats.org/presentationml/2006/main">
+  <p:cSld>
+    <p:spTree>
+      <p:nvGrpSpPr>
+        <p:cNvPr id="1" name=""/>
+        <p:cNvGrpSpPr/>
+        <p:nvPr/>
+      </p:nvGrpSpPr>
+      <p:grpSpPr>
+        <a:xfrm>
+          <a:off x="0" y="0"/>
+          <a:ext cx="0" cy="0"/>
+          <a:chOff x="0" y="0"/>
+          <a:chExt cx="0" cy="0"/>
+        </a:xfrm>
+      </p:grpSpPr>
+      <p:sp>
+        <p:nvSpPr>
+          <p:cNvPr id="2" name="Title 1">
+            <a:extLst>
+              <a:ext uri="{FF2B5EF4-FFF2-40B4-BE49-F238E27FC236}">
+                <a16:creationId xmlns:a16="http://schemas.microsoft.com/office/drawing/2014/main" id="{174A0EC3-D9B5-1C49-9F9C-486C60C1956F}"/>
+              </a:ext>
+            </a:extLst>
+          </p:cNvPr>
+          <p:cNvSpPr>
+            <a:spLocks noGrp="1"/>
+          </p:cNvSpPr>
+          <p:nvPr>
+            <p:ph type="title"/>
+          </p:nvPr>
+        </p:nvSpPr>
+        <p:spPr/>
+        <p:txBody>
+          <a:bodyPr/>
+          <a:lstStyle/>
+          <a:p>
+            <a:r>
+              <a:rPr lang="en-US" dirty="0"/>
+              <a:t>Basic necessity of an Application for Q</a:t>
+            </a:r>
+          </a:p>
+        </p:txBody>
+      </p:sp>
+      <p:sp>
+        <p:nvSpPr>
+          <p:cNvPr id="3" name="Content Placeholder 2">
+            <a:extLst>
+              <a:ext uri="{FF2B5EF4-FFF2-40B4-BE49-F238E27FC236}">
+                <a16:creationId xmlns:a16="http://schemas.microsoft.com/office/drawing/2014/main" id="{2DDAEF0B-2645-E346-9DEC-DE501E32A45D}"/>
+              </a:ext>
+            </a:extLst>
+          </p:cNvPr>
+          <p:cNvSpPr>
+            <a:spLocks noGrp="1"/>
+          </p:cNvSpPr>
+          <p:nvPr>
+            <p:ph idx="1"/>
+          </p:nvPr>
+        </p:nvSpPr>
+        <p:spPr/>
+        <p:txBody>
+          <a:bodyPr/>
+          <a:lstStyle/>
+          <a:p>
+            <a:r>
+              <a:rPr lang="en-US" dirty="0"/>
+              <a:t>FIFO</a:t>
+            </a:r>
+          </a:p>
+          <a:p>
+            <a:r>
+              <a:rPr lang="en-US" dirty="0"/>
+              <a:t>Should work with H-</a:t>
+            </a:r>
+            <a:r>
+              <a:rPr lang="en-US" dirty="0" err="1"/>
+              <a:t>Scalled</a:t>
+            </a:r>
+            <a:r>
+              <a:rPr lang="en-US" dirty="0"/>
+              <a:t> Services (Multiple Subscribers)</a:t>
+            </a:r>
+          </a:p>
+          <a:p>
+            <a:r>
+              <a:rPr lang="en-US" dirty="0"/>
+              <a:t>Provide Acks to flag a message has been successfully read.</a:t>
+            </a:r>
+          </a:p>
+          <a:p>
+            <a:r>
+              <a:rPr lang="en-US" dirty="0"/>
+              <a:t>With  Ack we also needs Timeouts In case the subscriber dies.</a:t>
+            </a:r>
+          </a:p>
+          <a:p>
+            <a:r>
+              <a:rPr lang="en-US" dirty="0"/>
+              <a:t>Should be Fast and can scale to  10Million entries .</a:t>
+            </a:r>
+          </a:p>
+        </p:txBody>
+      </p:sp>
+    </p:spTree>
+    <p:extLst>
+      <p:ext uri="{BB962C8B-B14F-4D97-AF65-F5344CB8AC3E}">
+        <p14:creationId xmlns:p14="http://schemas.microsoft.com/office/powerpoint/2010/main" val="3311451732"/>
+      </p:ext>
+    </p:extLst>
+  </p:cSld>
+  <p:clrMapOvr>
+    <a:masterClrMapping/>
+  </p:clrMapOvr>
+</p:sld>
+</file>
+
+<file path=ppt/slides/slide3.xml><?xml version="1.0" encoding="utf-8"?>
+<p:sld xmlns:a="http://schemas.openxmlformats.org/drawingml/2006/main" xmlns:r="http://schemas.openxmlformats.org/officeDocument/2006/relationships" xmlns:p="http://schemas.openxmlformats.org/presentationml/2006/main">
+  <p:cSld>
+    <p:spTree>
+      <p:nvGrpSpPr>
+        <p:cNvPr id="1" name=""/>
+        <p:cNvGrpSpPr/>
+        <p:nvPr/>
+      </p:nvGrpSpPr>
+      <p:grpSpPr>
+        <a:xfrm>
+          <a:off x="0" y="0"/>
+          <a:ext cx="0" cy="0"/>
+          <a:chOff x="0" y="0"/>
+          <a:chExt cx="0" cy="0"/>
+        </a:xfrm>
+      </p:grpSpPr>
+      <p:sp>
+        <p:nvSpPr>
+          <p:cNvPr id="2" name="Title 1">
+            <a:extLst>
+              <a:ext uri="{FF2B5EF4-FFF2-40B4-BE49-F238E27FC236}">
+                <a16:creationId xmlns:a16="http://schemas.microsoft.com/office/drawing/2014/main" id="{DFF7FE75-D0B9-534B-BF58-925BE4ECFE39}"/>
+              </a:ext>
+            </a:extLst>
+          </p:cNvPr>
+          <p:cNvSpPr>
+            <a:spLocks noGrp="1"/>
+          </p:cNvSpPr>
+          <p:nvPr>
+            <p:ph type="title"/>
+          </p:nvPr>
+        </p:nvSpPr>
+        <p:spPr/>
+        <p:txBody>
+          <a:bodyPr/>
+          <a:lstStyle/>
+          <a:p>
+            <a:r>
+              <a:rPr lang="en-US" dirty="0"/>
+              <a:t>What does it take to implement Q in RDBMS</a:t>
+            </a:r>
+          </a:p>
+        </p:txBody>
+      </p:sp>
+      <p:sp>
+        <p:nvSpPr>
+          <p:cNvPr id="3" name="Content Placeholder 2">
+            <a:extLst>
+              <a:ext uri="{FF2B5EF4-FFF2-40B4-BE49-F238E27FC236}">
+                <a16:creationId xmlns:a16="http://schemas.microsoft.com/office/drawing/2014/main" id="{837827D3-F706-1646-B486-F7D676D41C47}"/>
+              </a:ext>
+            </a:extLst>
+          </p:cNvPr>
+          <p:cNvSpPr>
+            <a:spLocks noGrp="1"/>
+          </p:cNvSpPr>
+          <p:nvPr>
+            <p:ph idx="1"/>
+          </p:nvPr>
+        </p:nvSpPr>
+        <p:spPr/>
+        <p:txBody>
+          <a:bodyPr/>
+          <a:lstStyle/>
+          <a:p>
+            <a:r>
+              <a:rPr lang="en-US" dirty="0"/>
+              <a:t>It provides ACID Transactions which should help with only one thread/subscriber to change or update data.</a:t>
+            </a:r>
+          </a:p>
+          <a:p>
+            <a:r>
+              <a:rPr lang="en-US" dirty="0"/>
+              <a:t>Clean up of data once its read from Q</a:t>
+            </a:r>
+          </a:p>
+          <a:p>
+            <a:r>
+              <a:rPr lang="en-US" dirty="0"/>
+              <a:t>Should not lock up reads and writes</a:t>
+            </a:r>
+          </a:p>
+          <a:p>
+            <a:pPr marL="0" indent="0">
+              <a:buNone/>
+            </a:pPr>
+            <a:endParaRPr lang="en-US" dirty="0"/>
+          </a:p>
+        </p:txBody>
+      </p:sp>
+    </p:spTree>
+    <p:extLst>
+      <p:ext uri="{BB962C8B-B14F-4D97-AF65-F5344CB8AC3E}">
+        <p14:creationId xmlns:p14="http://schemas.microsoft.com/office/powerpoint/2010/main" val="404762516"/>
+      </p:ext>
+    </p:extLst>
+  </p:cSld>
+  <p:clrMapOvr>
+    <a:masterClrMapping/>
+  </p:clrMapOvr>
+</p:sld>
+</file>
+
+<file path=ppt/slides/slide4.xml><?xml version="1.0" encoding="utf-8"?>
+<p:sld xmlns:a="http://schemas.openxmlformats.org/drawingml/2006/main" xmlns:r="http://schemas.openxmlformats.org/officeDocument/2006/relationships" xmlns:p="http://schemas.openxmlformats.org/presentationml/2006/main">
+  <p:cSld>
+    <p:spTree>
+      <p:nvGrpSpPr>
+        <p:cNvPr id="1" name=""/>
+        <p:cNvGrpSpPr/>
+        <p:nvPr/>
+      </p:nvGrpSpPr>
+      <p:grpSpPr>
+        <a:xfrm>
+          <a:off x="0" y="0"/>
+          <a:ext cx="0" cy="0"/>
+          <a:chOff x="0" y="0"/>
+          <a:chExt cx="0" cy="0"/>
+        </a:xfrm>
+      </p:grpSpPr>
+      <p:sp>
+        <p:nvSpPr>
+          <p:cNvPr id="2" name="Title 1">
+            <a:extLst>
+              <a:ext uri="{FF2B5EF4-FFF2-40B4-BE49-F238E27FC236}">
+                <a16:creationId xmlns:a16="http://schemas.microsoft.com/office/drawing/2014/main" id="{13C97855-6307-2149-9CD9-294E852D6F03}"/>
+              </a:ext>
+            </a:extLst>
+          </p:cNvPr>
+          <p:cNvSpPr>
+            <a:spLocks noGrp="1"/>
+          </p:cNvSpPr>
+          <p:nvPr>
+            <p:ph type="title"/>
+          </p:nvPr>
+        </p:nvSpPr>
+        <p:spPr/>
+        <p:txBody>
+          <a:bodyPr/>
+          <a:lstStyle/>
+          <a:p>
+            <a:r>
+              <a:rPr lang="en-US" dirty="0"/>
+              <a:t>Concept</a:t>
+            </a:r>
+          </a:p>
+        </p:txBody>
+      </p:sp>
+      <p:sp>
+        <p:nvSpPr>
+          <p:cNvPr id="3" name="Content Placeholder 2">
+            <a:extLst>
+              <a:ext uri="{FF2B5EF4-FFF2-40B4-BE49-F238E27FC236}">
+                <a16:creationId xmlns:a16="http://schemas.microsoft.com/office/drawing/2014/main" id="{D62CD197-11CC-2248-8FB8-485F495C479B}"/>
+              </a:ext>
+            </a:extLst>
+          </p:cNvPr>
+          <p:cNvSpPr>
+            <a:spLocks noGrp="1"/>
+          </p:cNvSpPr>
+          <p:nvPr>
+            <p:ph idx="1"/>
+          </p:nvPr>
+        </p:nvSpPr>
+        <p:spPr>
+          <a:xfrm>
+            <a:off x="838200" y="1825625"/>
+            <a:ext cx="10515600" cy="2024480"/>
+          </a:xfrm>
+        </p:spPr>
+        <p:txBody>
+          <a:bodyPr>
+            <a:normAutofit/>
+          </a:bodyPr>
+          <a:lstStyle/>
+          <a:p>
+            <a:r>
+              <a:rPr lang="en-US" dirty="0"/>
+              <a:t>Let subscriber have and Unique Id</a:t>
+            </a:r>
+          </a:p>
+          <a:p>
+            <a:r>
+              <a:rPr lang="en-US" dirty="0"/>
+              <a:t>Let each subscriber have a cursor/pointer for a given Q.</a:t>
+            </a:r>
+          </a:p>
+          <a:p>
+            <a:r>
+              <a:rPr lang="en-US" dirty="0"/>
+              <a:t>Increment the pointer only if we have received ACK or Times Up.</a:t>
+            </a:r>
+          </a:p>
+          <a:p>
+            <a:r>
+              <a:rPr lang="en-US" dirty="0"/>
+              <a:t>Make above operations thread safe or Sequential</a:t>
+            </a:r>
+          </a:p>
+          <a:p>
+            <a:endParaRPr lang="en-US" dirty="0"/>
+          </a:p>
+        </p:txBody>
+      </p:sp>
+      <p:sp>
+        <p:nvSpPr>
+          <p:cNvPr id="4" name="Rounded Rectangle 3">
+            <a:extLst>
+              <a:ext uri="{FF2B5EF4-FFF2-40B4-BE49-F238E27FC236}">
+                <a16:creationId xmlns:a16="http://schemas.microsoft.com/office/drawing/2014/main" id="{1F7EC84B-AE94-F042-997F-94F2660A32E0}"/>
+              </a:ext>
+            </a:extLst>
+          </p:cNvPr>
+          <p:cNvSpPr/>
+          <p:nvPr/>
+        </p:nvSpPr>
+        <p:spPr>
+          <a:xfrm>
+            <a:off x="6334226" y="4434037"/>
+            <a:ext cx="885525" cy="327259"/>
+          </a:xfrm>
+          <a:prstGeom prst="roundRect">
+            <a:avLst/>
+          </a:prstGeom>
+        </p:spPr>
+        <p:style>
+          <a:lnRef idx="2">
+            <a:schemeClr val="accent1">
+              <a:shade val="50000"/>
+            </a:schemeClr>
+          </a:lnRef>
+          <a:fillRef idx="1">
+            <a:schemeClr val="accent1"/>
+          </a:fillRef>
+          <a:effectRef idx="0">
+            <a:schemeClr val="accent1"/>
+          </a:effectRef>
+          <a:fontRef idx="minor">
+            <a:schemeClr val="lt1"/>
+          </a:fontRef>
+        </p:style>
+        <p:txBody>
+          <a:bodyPr rtlCol="0" anchor="ctr"/>
+          <a:lstStyle/>
+          <a:p>
+            <a:pPr algn="ctr"/>
+            <a:r>
+              <a:rPr lang="en-US" sz="1200" dirty="0"/>
+              <a:t>S-1</a:t>
+            </a:r>
+          </a:p>
+        </p:txBody>
+      </p:sp>
+      <p:sp>
+        <p:nvSpPr>
+          <p:cNvPr id="5" name="Rounded Rectangle 4">
+            <a:extLst>
+              <a:ext uri="{FF2B5EF4-FFF2-40B4-BE49-F238E27FC236}">
+                <a16:creationId xmlns:a16="http://schemas.microsoft.com/office/drawing/2014/main" id="{4FE7B9B7-E124-9346-AA80-BDD67CAD7036}"/>
+              </a:ext>
+            </a:extLst>
+          </p:cNvPr>
+          <p:cNvSpPr/>
+          <p:nvPr/>
+        </p:nvSpPr>
+        <p:spPr>
+          <a:xfrm>
+            <a:off x="1905800" y="4283242"/>
+            <a:ext cx="587141" cy="827773"/>
+          </a:xfrm>
+          <a:prstGeom prst="roundRect">
+            <a:avLst/>
+          </a:prstGeom>
+        </p:spPr>
+        <p:style>
+          <a:lnRef idx="2">
+            <a:schemeClr val="accent1">
+              <a:shade val="50000"/>
+            </a:schemeClr>
+          </a:lnRef>
+          <a:fillRef idx="1">
+            <a:schemeClr val="accent1"/>
+          </a:fillRef>
+          <a:effectRef idx="0">
+            <a:schemeClr val="accent1"/>
+          </a:effectRef>
+          <a:fontRef idx="minor">
+            <a:schemeClr val="lt1"/>
+          </a:fontRef>
+        </p:style>
+        <p:txBody>
+          <a:bodyPr rtlCol="0" anchor="ctr"/>
+          <a:lstStyle/>
+          <a:p>
+            <a:pPr algn="ctr"/>
+            <a:r>
+              <a:rPr lang="en-US" sz="1200" dirty="0"/>
+              <a:t>M-1</a:t>
+            </a:r>
+          </a:p>
+        </p:txBody>
+      </p:sp>
+      <p:sp>
+        <p:nvSpPr>
+          <p:cNvPr id="7" name="Rounded Rectangle 6">
+            <a:extLst>
+              <a:ext uri="{FF2B5EF4-FFF2-40B4-BE49-F238E27FC236}">
+                <a16:creationId xmlns:a16="http://schemas.microsoft.com/office/drawing/2014/main" id="{7F9BD0CC-2929-F549-AC87-C7ACC9B6202F}"/>
+              </a:ext>
+            </a:extLst>
+          </p:cNvPr>
+          <p:cNvSpPr/>
+          <p:nvPr/>
+        </p:nvSpPr>
+        <p:spPr>
+          <a:xfrm>
+            <a:off x="1905800" y="5202454"/>
+            <a:ext cx="587141" cy="221381"/>
+          </a:xfrm>
+          <a:prstGeom prst="roundRect">
+            <a:avLst/>
+          </a:prstGeom>
+        </p:spPr>
+        <p:style>
+          <a:lnRef idx="2">
+            <a:schemeClr val="accent6">
+              <a:shade val="50000"/>
+            </a:schemeClr>
+          </a:lnRef>
+          <a:fillRef idx="1">
+            <a:schemeClr val="accent6"/>
+          </a:fillRef>
+          <a:effectRef idx="0">
+            <a:schemeClr val="accent6"/>
+          </a:effectRef>
+          <a:fontRef idx="minor">
+            <a:schemeClr val="lt1"/>
+          </a:fontRef>
+        </p:style>
+        <p:txBody>
+          <a:bodyPr rtlCol="0" anchor="ctr"/>
+          <a:lstStyle/>
+          <a:p>
+            <a:pPr algn="ctr"/>
+            <a:r>
+              <a:rPr lang="en-US" sz="1200" dirty="0"/>
+              <a:t>DEL</a:t>
+            </a:r>
+          </a:p>
+        </p:txBody>
+      </p:sp>
+      <p:sp>
+        <p:nvSpPr>
+          <p:cNvPr id="9" name="Rounded Rectangle 8">
+            <a:extLst>
+              <a:ext uri="{FF2B5EF4-FFF2-40B4-BE49-F238E27FC236}">
+                <a16:creationId xmlns:a16="http://schemas.microsoft.com/office/drawing/2014/main" id="{91A502A9-3C58-CE4B-B6C9-4B26990F381D}"/>
+              </a:ext>
+            </a:extLst>
+          </p:cNvPr>
+          <p:cNvSpPr/>
+          <p:nvPr/>
+        </p:nvSpPr>
+        <p:spPr>
+          <a:xfrm>
+            <a:off x="2703092" y="4283242"/>
+            <a:ext cx="587141" cy="827773"/>
+          </a:xfrm>
+          <a:prstGeom prst="roundRect">
+            <a:avLst/>
+          </a:prstGeom>
+        </p:spPr>
+        <p:style>
+          <a:lnRef idx="2">
+            <a:schemeClr val="accent1">
+              <a:shade val="50000"/>
+            </a:schemeClr>
+          </a:lnRef>
+          <a:fillRef idx="1">
+            <a:schemeClr val="accent1"/>
+          </a:fillRef>
+          <a:effectRef idx="0">
+            <a:schemeClr val="accent1"/>
+          </a:effectRef>
+          <a:fontRef idx="minor">
+            <a:schemeClr val="lt1"/>
+          </a:fontRef>
+        </p:style>
+        <p:txBody>
+          <a:bodyPr rtlCol="0" anchor="ctr"/>
+          <a:lstStyle/>
+          <a:p>
+            <a:pPr algn="ctr"/>
+            <a:r>
+              <a:rPr lang="en-US" sz="1200" dirty="0"/>
+              <a:t>M-2</a:t>
+            </a:r>
+          </a:p>
+        </p:txBody>
+      </p:sp>
+      <p:sp>
+        <p:nvSpPr>
+          <p:cNvPr id="10" name="Rounded Rectangle 9">
+            <a:extLst>
+              <a:ext uri="{FF2B5EF4-FFF2-40B4-BE49-F238E27FC236}">
+                <a16:creationId xmlns:a16="http://schemas.microsoft.com/office/drawing/2014/main" id="{B2AE309C-281B-584D-B65D-0B33667A6E68}"/>
+              </a:ext>
+            </a:extLst>
+          </p:cNvPr>
+          <p:cNvSpPr/>
+          <p:nvPr/>
+        </p:nvSpPr>
+        <p:spPr>
+          <a:xfrm>
+            <a:off x="2703092" y="5202454"/>
+            <a:ext cx="587141" cy="221381"/>
+          </a:xfrm>
+          <a:prstGeom prst="roundRect">
+            <a:avLst/>
+          </a:prstGeom>
+        </p:spPr>
+        <p:style>
+          <a:lnRef idx="2">
+            <a:schemeClr val="accent6"/>
+          </a:lnRef>
+          <a:fillRef idx="1">
+            <a:schemeClr val="lt1"/>
+          </a:fillRef>
+          <a:effectRef idx="0">
+            <a:schemeClr val="accent6"/>
+          </a:effectRef>
+          <a:fontRef idx="minor">
+            <a:schemeClr val="dk1"/>
+          </a:fontRef>
+        </p:style>
+        <p:txBody>
+          <a:bodyPr rtlCol="0" anchor="ctr"/>
+          <a:lstStyle/>
+          <a:p>
+            <a:pPr algn="ctr"/>
+            <a:r>
+              <a:rPr lang="en-US" sz="1200" dirty="0"/>
+              <a:t>DEL</a:t>
+            </a:r>
+          </a:p>
+        </p:txBody>
+      </p:sp>
+      <p:sp>
+        <p:nvSpPr>
+          <p:cNvPr id="13" name="Rounded Rectangle 12">
+            <a:extLst>
+              <a:ext uri="{FF2B5EF4-FFF2-40B4-BE49-F238E27FC236}">
+                <a16:creationId xmlns:a16="http://schemas.microsoft.com/office/drawing/2014/main" id="{0BAADFF4-9791-AF4F-A73D-1373E778AAD9}"/>
+              </a:ext>
+            </a:extLst>
+          </p:cNvPr>
+          <p:cNvSpPr/>
+          <p:nvPr/>
+        </p:nvSpPr>
+        <p:spPr>
+          <a:xfrm>
+            <a:off x="3473113" y="4283242"/>
+            <a:ext cx="587141" cy="827773"/>
+          </a:xfrm>
+          <a:prstGeom prst="roundRect">
+            <a:avLst/>
+          </a:prstGeom>
+        </p:spPr>
+        <p:style>
+          <a:lnRef idx="2">
+            <a:schemeClr val="accent1">
+              <a:shade val="50000"/>
+            </a:schemeClr>
+          </a:lnRef>
+          <a:fillRef idx="1">
+            <a:schemeClr val="accent1"/>
+          </a:fillRef>
+          <a:effectRef idx="0">
+            <a:schemeClr val="accent1"/>
+          </a:effectRef>
+          <a:fontRef idx="minor">
+            <a:schemeClr val="lt1"/>
+          </a:fontRef>
+        </p:style>
+        <p:txBody>
+          <a:bodyPr rtlCol="0" anchor="ctr"/>
+          <a:lstStyle/>
+          <a:p>
+            <a:pPr algn="ctr"/>
+            <a:r>
+              <a:rPr lang="en-US" sz="1200" dirty="0"/>
+              <a:t>M-3</a:t>
+            </a:r>
+          </a:p>
+        </p:txBody>
+      </p:sp>
+      <p:sp>
+        <p:nvSpPr>
+          <p:cNvPr id="14" name="Rounded Rectangle 13">
+            <a:extLst>
+              <a:ext uri="{FF2B5EF4-FFF2-40B4-BE49-F238E27FC236}">
+                <a16:creationId xmlns:a16="http://schemas.microsoft.com/office/drawing/2014/main" id="{240862D8-B5D2-5F40-9907-250705E2308A}"/>
+              </a:ext>
+            </a:extLst>
+          </p:cNvPr>
+          <p:cNvSpPr/>
+          <p:nvPr/>
+        </p:nvSpPr>
+        <p:spPr>
+          <a:xfrm>
+            <a:off x="3473113" y="5202454"/>
+            <a:ext cx="587141" cy="221381"/>
+          </a:xfrm>
+          <a:prstGeom prst="roundRect">
+            <a:avLst/>
+          </a:prstGeom>
+        </p:spPr>
+        <p:style>
+          <a:lnRef idx="2">
+            <a:schemeClr val="accent6"/>
+          </a:lnRef>
+          <a:fillRef idx="1">
+            <a:schemeClr val="lt1"/>
+          </a:fillRef>
+          <a:effectRef idx="0">
+            <a:schemeClr val="accent6"/>
+          </a:effectRef>
+          <a:fontRef idx="minor">
+            <a:schemeClr val="dk1"/>
+          </a:fontRef>
+        </p:style>
+        <p:txBody>
+          <a:bodyPr rtlCol="0" anchor="ctr"/>
+          <a:lstStyle/>
+          <a:p>
+            <a:pPr algn="ctr"/>
+            <a:r>
+              <a:rPr lang="en-US" sz="1200" dirty="0"/>
+              <a:t>DEL</a:t>
+            </a:r>
+          </a:p>
+        </p:txBody>
+      </p:sp>
+      <p:sp>
+        <p:nvSpPr>
+          <p:cNvPr id="15" name="Rounded Rectangle 14">
+            <a:extLst>
+              <a:ext uri="{FF2B5EF4-FFF2-40B4-BE49-F238E27FC236}">
+                <a16:creationId xmlns:a16="http://schemas.microsoft.com/office/drawing/2014/main" id="{5BAD5990-C43D-5C4B-8E6E-C5046BEA043F}"/>
+              </a:ext>
+            </a:extLst>
+          </p:cNvPr>
+          <p:cNvSpPr/>
+          <p:nvPr/>
+        </p:nvSpPr>
+        <p:spPr>
+          <a:xfrm>
+            <a:off x="4270405" y="4283242"/>
+            <a:ext cx="587141" cy="827773"/>
+          </a:xfrm>
+          <a:prstGeom prst="roundRect">
+            <a:avLst/>
+          </a:prstGeom>
+        </p:spPr>
+        <p:style>
+          <a:lnRef idx="2">
+            <a:schemeClr val="accent1">
+              <a:shade val="50000"/>
+            </a:schemeClr>
+          </a:lnRef>
+          <a:fillRef idx="1">
+            <a:schemeClr val="accent1"/>
+          </a:fillRef>
+          <a:effectRef idx="0">
+            <a:schemeClr val="accent1"/>
+          </a:effectRef>
+          <a:fontRef idx="minor">
+            <a:schemeClr val="lt1"/>
+          </a:fontRef>
+        </p:style>
+        <p:txBody>
+          <a:bodyPr rtlCol="0" anchor="ctr"/>
+          <a:lstStyle/>
+          <a:p>
+            <a:pPr algn="ctr"/>
+            <a:r>
+              <a:rPr lang="en-US" sz="1200" dirty="0"/>
+              <a:t>M-4</a:t>
+            </a:r>
+          </a:p>
+        </p:txBody>
+      </p:sp>
+      <p:sp>
+        <p:nvSpPr>
+          <p:cNvPr id="16" name="Rounded Rectangle 15">
+            <a:extLst>
+              <a:ext uri="{FF2B5EF4-FFF2-40B4-BE49-F238E27FC236}">
+                <a16:creationId xmlns:a16="http://schemas.microsoft.com/office/drawing/2014/main" id="{D16F658E-5DFF-DB44-B18F-ABE21FD724F3}"/>
+              </a:ext>
+            </a:extLst>
+          </p:cNvPr>
+          <p:cNvSpPr/>
+          <p:nvPr/>
+        </p:nvSpPr>
+        <p:spPr>
+          <a:xfrm>
+            <a:off x="4270405" y="5202454"/>
+            <a:ext cx="587141" cy="221381"/>
+          </a:xfrm>
+          <a:prstGeom prst="roundRect">
+            <a:avLst/>
+          </a:prstGeom>
+        </p:spPr>
+        <p:style>
+          <a:lnRef idx="2">
+            <a:schemeClr val="accent6"/>
+          </a:lnRef>
+          <a:fillRef idx="1">
+            <a:schemeClr val="lt1"/>
+          </a:fillRef>
+          <a:effectRef idx="0">
+            <a:schemeClr val="accent6"/>
+          </a:effectRef>
+          <a:fontRef idx="minor">
+            <a:schemeClr val="dk1"/>
+          </a:fontRef>
+        </p:style>
+        <p:txBody>
+          <a:bodyPr rtlCol="0" anchor="ctr"/>
+          <a:lstStyle/>
+          <a:p>
+            <a:pPr algn="ctr"/>
+            <a:r>
+              <a:rPr lang="en-US" sz="1200" dirty="0"/>
+              <a:t>DEL</a:t>
+            </a:r>
+          </a:p>
+        </p:txBody>
+      </p:sp>
+      <p:sp>
+        <p:nvSpPr>
+          <p:cNvPr id="17" name="Rounded Rectangle 16">
+            <a:extLst>
+              <a:ext uri="{FF2B5EF4-FFF2-40B4-BE49-F238E27FC236}">
+                <a16:creationId xmlns:a16="http://schemas.microsoft.com/office/drawing/2014/main" id="{03283396-256D-3E49-BDC0-41923086A729}"/>
+              </a:ext>
+            </a:extLst>
+          </p:cNvPr>
+          <p:cNvSpPr/>
+          <p:nvPr/>
+        </p:nvSpPr>
+        <p:spPr>
+          <a:xfrm>
+            <a:off x="6334226" y="4915300"/>
+            <a:ext cx="885525" cy="287154"/>
+          </a:xfrm>
+          <a:prstGeom prst="roundRect">
+            <a:avLst/>
+          </a:prstGeom>
+        </p:spPr>
+        <p:style>
+          <a:lnRef idx="2">
+            <a:schemeClr val="accent1">
+              <a:shade val="50000"/>
+            </a:schemeClr>
+          </a:lnRef>
+          <a:fillRef idx="1">
+            <a:schemeClr val="accent1"/>
+          </a:fillRef>
+          <a:effectRef idx="0">
+            <a:schemeClr val="accent1"/>
+          </a:effectRef>
+          <a:fontRef idx="minor">
+            <a:schemeClr val="lt1"/>
+          </a:fontRef>
+        </p:style>
+        <p:txBody>
+          <a:bodyPr rtlCol="0" anchor="ctr"/>
+          <a:lstStyle/>
+          <a:p>
+            <a:pPr algn="ctr"/>
+            <a:r>
+              <a:rPr lang="en-US" sz="1200" dirty="0"/>
+              <a:t>S-1</a:t>
+            </a:r>
+          </a:p>
+        </p:txBody>
+      </p:sp>
+      <p:sp>
+        <p:nvSpPr>
+          <p:cNvPr id="18" name="Rounded Rectangle 17">
+            <a:extLst>
+              <a:ext uri="{FF2B5EF4-FFF2-40B4-BE49-F238E27FC236}">
+                <a16:creationId xmlns:a16="http://schemas.microsoft.com/office/drawing/2014/main" id="{960F7427-4765-B145-A8EF-C55EC2874BDA}"/>
+              </a:ext>
+            </a:extLst>
+          </p:cNvPr>
+          <p:cNvSpPr/>
+          <p:nvPr/>
+        </p:nvSpPr>
+        <p:spPr>
+          <a:xfrm>
+            <a:off x="7353699" y="4434037"/>
+            <a:ext cx="885525" cy="327259"/>
+          </a:xfrm>
+          <a:prstGeom prst="roundRect">
+            <a:avLst/>
+          </a:prstGeom>
+        </p:spPr>
+        <p:style>
+          <a:lnRef idx="2">
+            <a:schemeClr val="accent1">
+              <a:shade val="50000"/>
+            </a:schemeClr>
+          </a:lnRef>
+          <a:fillRef idx="1">
+            <a:schemeClr val="accent1"/>
+          </a:fillRef>
+          <a:effectRef idx="0">
+            <a:schemeClr val="accent1"/>
+          </a:effectRef>
+          <a:fontRef idx="minor">
+            <a:schemeClr val="lt1"/>
+          </a:fontRef>
+        </p:style>
+        <p:txBody>
+          <a:bodyPr rtlCol="0" anchor="ctr"/>
+          <a:lstStyle/>
+          <a:p>
+            <a:pPr algn="ctr"/>
+            <a:r>
+              <a:rPr lang="en-US" sz="1200" dirty="0"/>
+              <a:t>M-2</a:t>
+            </a:r>
+          </a:p>
+        </p:txBody>
+      </p:sp>
+      <p:sp>
+        <p:nvSpPr>
+          <p:cNvPr id="19" name="Rounded Rectangle 18">
+            <a:extLst>
+              <a:ext uri="{FF2B5EF4-FFF2-40B4-BE49-F238E27FC236}">
+                <a16:creationId xmlns:a16="http://schemas.microsoft.com/office/drawing/2014/main" id="{F6C972D6-6202-F046-BAA3-8440F3D0B5D6}"/>
+              </a:ext>
+            </a:extLst>
+          </p:cNvPr>
+          <p:cNvSpPr/>
+          <p:nvPr/>
+        </p:nvSpPr>
+        <p:spPr>
+          <a:xfrm>
+            <a:off x="8433329" y="4434037"/>
+            <a:ext cx="587141" cy="327259"/>
+          </a:xfrm>
+          <a:prstGeom prst="roundRect">
+            <a:avLst/>
+          </a:prstGeom>
+        </p:spPr>
+        <p:style>
+          <a:lnRef idx="2">
+            <a:schemeClr val="accent2">
+              <a:shade val="50000"/>
+            </a:schemeClr>
+          </a:lnRef>
+          <a:fillRef idx="1">
+            <a:schemeClr val="accent2"/>
+          </a:fillRef>
+          <a:effectRef idx="0">
+            <a:schemeClr val="accent2"/>
+          </a:effectRef>
+          <a:fontRef idx="minor">
+            <a:schemeClr val="lt1"/>
+          </a:fontRef>
+        </p:style>
+        <p:txBody>
+          <a:bodyPr rtlCol="0" anchor="ctr"/>
+          <a:lstStyle/>
+          <a:p>
+            <a:pPr algn="ctr"/>
+            <a:r>
+              <a:rPr lang="en-US" sz="1200" dirty="0"/>
+              <a:t>ACK</a:t>
+            </a:r>
+          </a:p>
+        </p:txBody>
+      </p:sp>
+      <p:sp>
+        <p:nvSpPr>
+          <p:cNvPr id="20" name="Rounded Rectangle 19">
+            <a:extLst>
+              <a:ext uri="{FF2B5EF4-FFF2-40B4-BE49-F238E27FC236}">
+                <a16:creationId xmlns:a16="http://schemas.microsoft.com/office/drawing/2014/main" id="{1558166D-32C3-7B4D-B844-B210DCFB90B2}"/>
+              </a:ext>
+            </a:extLst>
+          </p:cNvPr>
+          <p:cNvSpPr/>
+          <p:nvPr/>
+        </p:nvSpPr>
+        <p:spPr>
+          <a:xfrm>
+            <a:off x="7353699" y="4875195"/>
+            <a:ext cx="885525" cy="327259"/>
+          </a:xfrm>
+          <a:prstGeom prst="roundRect">
+            <a:avLst/>
+          </a:prstGeom>
+        </p:spPr>
+        <p:style>
+          <a:lnRef idx="2">
+            <a:schemeClr val="accent1">
+              <a:shade val="50000"/>
+            </a:schemeClr>
+          </a:lnRef>
+          <a:fillRef idx="1">
+            <a:schemeClr val="accent1"/>
+          </a:fillRef>
+          <a:effectRef idx="0">
+            <a:schemeClr val="accent1"/>
+          </a:effectRef>
+          <a:fontRef idx="minor">
+            <a:schemeClr val="lt1"/>
+          </a:fontRef>
+        </p:style>
+        <p:txBody>
+          <a:bodyPr rtlCol="0" anchor="ctr"/>
+          <a:lstStyle/>
+          <a:p>
+            <a:pPr algn="ctr"/>
+            <a:r>
+              <a:rPr lang="en-US" sz="1200" dirty="0"/>
+              <a:t>M-3</a:t>
+            </a:r>
+          </a:p>
+        </p:txBody>
+      </p:sp>
+      <p:sp>
+        <p:nvSpPr>
+          <p:cNvPr id="21" name="Rounded Rectangle 20">
+            <a:extLst>
+              <a:ext uri="{FF2B5EF4-FFF2-40B4-BE49-F238E27FC236}">
+                <a16:creationId xmlns:a16="http://schemas.microsoft.com/office/drawing/2014/main" id="{3210EDA9-98A6-3146-BC8E-6E45D51101D7}"/>
+              </a:ext>
+            </a:extLst>
+          </p:cNvPr>
+          <p:cNvSpPr/>
+          <p:nvPr/>
+        </p:nvSpPr>
+        <p:spPr>
+          <a:xfrm>
+            <a:off x="8433329" y="4875195"/>
+            <a:ext cx="587141" cy="327259"/>
+          </a:xfrm>
+          <a:prstGeom prst="roundRect">
+            <a:avLst/>
+          </a:prstGeom>
+        </p:spPr>
+        <p:style>
+          <a:lnRef idx="2">
+            <a:schemeClr val="accent6">
+              <a:shade val="50000"/>
+            </a:schemeClr>
+          </a:lnRef>
+          <a:fillRef idx="1">
+            <a:schemeClr val="accent6"/>
+          </a:fillRef>
+          <a:effectRef idx="0">
+            <a:schemeClr val="accent6"/>
+          </a:effectRef>
+          <a:fontRef idx="minor">
+            <a:schemeClr val="lt1"/>
+          </a:fontRef>
+        </p:style>
+        <p:txBody>
+          <a:bodyPr rtlCol="0" anchor="ctr"/>
+          <a:lstStyle/>
+          <a:p>
+            <a:pPr algn="ctr"/>
+            <a:r>
+              <a:rPr lang="en-US" sz="1200" dirty="0"/>
+              <a:t>ACK</a:t>
+            </a:r>
+          </a:p>
+        </p:txBody>
+      </p:sp>
+      <p:sp>
+        <p:nvSpPr>
+          <p:cNvPr id="23" name="Rectangle 22">
+            <a:extLst>
+              <a:ext uri="{FF2B5EF4-FFF2-40B4-BE49-F238E27FC236}">
+                <a16:creationId xmlns:a16="http://schemas.microsoft.com/office/drawing/2014/main" id="{0CA9A926-AB7C-F841-8709-F2852C1EF9FD}"/>
+              </a:ext>
+            </a:extLst>
+          </p:cNvPr>
+          <p:cNvSpPr/>
+          <p:nvPr/>
+        </p:nvSpPr>
+        <p:spPr>
+          <a:xfrm>
+            <a:off x="1636295" y="4167739"/>
+            <a:ext cx="3465094" cy="1424539"/>
+          </a:xfrm>
+          <a:prstGeom prst="rect">
+            <a:avLst/>
+          </a:prstGeom>
+          <a:noFill/>
+          <a:ln w="9525" cap="flat" cmpd="sng" algn="ctr">
+            <a:solidFill>
+              <a:schemeClr val="dk1"/>
+            </a:solidFill>
+            <a:prstDash val="solid"/>
+            <a:round/>
+            <a:headEnd type="none" w="med" len="med"/>
+            <a:tailEnd type="none" w="med" len="med"/>
+          </a:ln>
+        </p:spPr>
+        <p:style>
+          <a:lnRef idx="0">
+            <a:scrgbClr r="0" g="0" b="0"/>
+          </a:lnRef>
+          <a:fillRef idx="0">
+            <a:scrgbClr r="0" g="0" b="0"/>
+          </a:fillRef>
+          <a:effectRef idx="0">
+            <a:scrgbClr r="0" g="0" b="0"/>
+          </a:effectRef>
+          <a:fontRef idx="minor">
+            <a:schemeClr val="dk1"/>
+          </a:fontRef>
+        </p:style>
+        <p:txBody>
+          <a:bodyPr rtlCol="0" anchor="ctr"/>
+          <a:lstStyle/>
+          <a:p>
+            <a:pPr algn="ctr"/>
+            <a:endParaRPr lang="en-US"/>
+          </a:p>
+        </p:txBody>
+      </p:sp>
+      <p:sp>
+        <p:nvSpPr>
+          <p:cNvPr id="25" name="TextBox 24">
+            <a:extLst>
+              <a:ext uri="{FF2B5EF4-FFF2-40B4-BE49-F238E27FC236}">
+                <a16:creationId xmlns:a16="http://schemas.microsoft.com/office/drawing/2014/main" id="{7C0046F6-812C-9B46-934E-B8A57F1B3E57}"/>
+              </a:ext>
+            </a:extLst>
+          </p:cNvPr>
+          <p:cNvSpPr txBox="1"/>
+          <p:nvPr/>
+        </p:nvSpPr>
+        <p:spPr>
+          <a:xfrm>
+            <a:off x="2939076" y="5611529"/>
+            <a:ext cx="859531" cy="369332"/>
+          </a:xfrm>
+          <a:prstGeom prst="rect">
+            <a:avLst/>
+          </a:prstGeom>
+          <a:noFill/>
+        </p:spPr>
+        <p:txBody>
+          <a:bodyPr wrap="none" rtlCol="0">
+            <a:spAutoFit/>
+          </a:bodyPr>
+          <a:lstStyle/>
+          <a:p>
+            <a:r>
+              <a:rPr lang="en-US" dirty="0"/>
+              <a:t>QUEUE</a:t>
+            </a:r>
+          </a:p>
+        </p:txBody>
+      </p:sp>
+    </p:spTree>
+    <p:extLst>
+      <p:ext uri="{BB962C8B-B14F-4D97-AF65-F5344CB8AC3E}">
+        <p14:creationId xmlns:p14="http://schemas.microsoft.com/office/powerpoint/2010/main" val="462193259"/>
+      </p:ext>
+    </p:extLst>
+  </p:cSld>
+  <p:clrMapOvr>
+    <a:masterClrMapping/>
+  </p:clrMapOvr>
+</p:sld>
+</file>
+
+<file path=ppt/slides/slide5.xml><?xml version="1.0" encoding="utf-8"?>
+<p:sld xmlns:a="http://schemas.openxmlformats.org/drawingml/2006/main" xmlns:r="http://schemas.openxmlformats.org/officeDocument/2006/relationships" xmlns:p="http://schemas.openxmlformats.org/presentationml/2006/main">
+  <p:cSld>
+    <p:spTree>
+      <p:nvGrpSpPr>
+        <p:cNvPr id="1" name=""/>
+        <p:cNvGrpSpPr/>
+        <p:nvPr/>
+      </p:nvGrpSpPr>
+      <p:grpSpPr>
+        <a:xfrm>
+          <a:off x="0" y="0"/>
+          <a:ext cx="0" cy="0"/>
+          <a:chOff x="0" y="0"/>
+          <a:chExt cx="0" cy="0"/>
+        </a:xfrm>
+      </p:grpSpPr>
+      <p:sp>
+        <p:nvSpPr>
+          <p:cNvPr id="2" name="Title 1">
+            <a:extLst>
+              <a:ext uri="{FF2B5EF4-FFF2-40B4-BE49-F238E27FC236}">
+                <a16:creationId xmlns:a16="http://schemas.microsoft.com/office/drawing/2014/main" id="{FFEE4C21-A58B-0643-82A2-A615D3673BDB}"/>
+              </a:ext>
+            </a:extLst>
+          </p:cNvPr>
+          <p:cNvSpPr>
+            <a:spLocks noGrp="1"/>
+          </p:cNvSpPr>
+          <p:nvPr>
+            <p:ph type="title"/>
+          </p:nvPr>
+        </p:nvSpPr>
+        <p:spPr/>
+        <p:txBody>
+          <a:bodyPr/>
+          <a:lstStyle/>
+          <a:p>
+            <a:r>
+              <a:rPr lang="en-US" dirty="0"/>
+              <a:t>Fitting concept in Tables</a:t>
+            </a:r>
+          </a:p>
+        </p:txBody>
+      </p:sp>
+      <p:graphicFrame>
+        <p:nvGraphicFramePr>
+          <p:cNvPr id="4" name="Table 3">
+            <a:extLst>
+              <a:ext uri="{FF2B5EF4-FFF2-40B4-BE49-F238E27FC236}">
+                <a16:creationId xmlns:a16="http://schemas.microsoft.com/office/drawing/2014/main" id="{2DAD5F56-5B59-3340-8CBB-5043DF89B85E}"/>
+              </a:ext>
+            </a:extLst>
+          </p:cNvPr>
+          <p:cNvGraphicFramePr>
+            <a:graphicFrameLocks noGrp="1"/>
+          </p:cNvGraphicFramePr>
+          <p:nvPr>
+            <p:extLst>
+              <p:ext uri="{D42A27DB-BD31-4B8C-83A1-F6EECF244321}">
+                <p14:modId xmlns:p14="http://schemas.microsoft.com/office/powerpoint/2010/main" val="212282756"/>
+              </p:ext>
+            </p:extLst>
+          </p:nvPr>
+        </p:nvGraphicFramePr>
+        <p:xfrm>
+          <a:off x="1040597" y="3314854"/>
+          <a:ext cx="7872396" cy="741680"/>
+        </p:xfrm>
+        <a:graphic>
+          <a:graphicData uri="http://schemas.openxmlformats.org/drawingml/2006/table">
+            <a:tbl>
+              <a:tblPr firstRow="1" bandRow="1">
+                <a:tableStyleId>{5C22544A-7EE6-4342-B048-85BDC9FD1C3A}</a:tableStyleId>
+              </a:tblPr>
+              <a:tblGrid>
+                <a:gridCol w="1312066">
+                  <a:extLst>
+                    <a:ext uri="{9D8B030D-6E8A-4147-A177-3AD203B41FA5}">
+                      <a16:colId xmlns:a16="http://schemas.microsoft.com/office/drawing/2014/main" val="3571632086"/>
+                    </a:ext>
+                  </a:extLst>
+                </a:gridCol>
+                <a:gridCol w="1312066">
+                  <a:extLst>
+                    <a:ext uri="{9D8B030D-6E8A-4147-A177-3AD203B41FA5}">
+                      <a16:colId xmlns:a16="http://schemas.microsoft.com/office/drawing/2014/main" val="3890069058"/>
+                    </a:ext>
+                  </a:extLst>
+                </a:gridCol>
+                <a:gridCol w="1312066">
+                  <a:extLst>
+                    <a:ext uri="{9D8B030D-6E8A-4147-A177-3AD203B41FA5}">
+                      <a16:colId xmlns:a16="http://schemas.microsoft.com/office/drawing/2014/main" val="1711983374"/>
+                    </a:ext>
+                  </a:extLst>
+                </a:gridCol>
+                <a:gridCol w="1312066">
+                  <a:extLst>
+                    <a:ext uri="{9D8B030D-6E8A-4147-A177-3AD203B41FA5}">
+                      <a16:colId xmlns:a16="http://schemas.microsoft.com/office/drawing/2014/main" val="3019512228"/>
+                    </a:ext>
+                  </a:extLst>
+                </a:gridCol>
+                <a:gridCol w="1312066">
+                  <a:extLst>
+                    <a:ext uri="{9D8B030D-6E8A-4147-A177-3AD203B41FA5}">
+                      <a16:colId xmlns:a16="http://schemas.microsoft.com/office/drawing/2014/main" val="2729116623"/>
+                    </a:ext>
+                  </a:extLst>
+                </a:gridCol>
+                <a:gridCol w="1312066">
+                  <a:extLst>
+                    <a:ext uri="{9D8B030D-6E8A-4147-A177-3AD203B41FA5}">
+                      <a16:colId xmlns:a16="http://schemas.microsoft.com/office/drawing/2014/main" val="1544137033"/>
+                    </a:ext>
+                  </a:extLst>
+                </a:gridCol>
+              </a:tblGrid>
+              <a:tr h="370840">
+                <a:tc>
+                  <a:txBody>
+                    <a:bodyPr/>
+                    <a:lstStyle/>
+                    <a:p>
+                      <a:r>
+                        <a:rPr lang="en-US" dirty="0"/>
+                        <a:t>Cursor-Id</a:t>
+                      </a:r>
+                    </a:p>
+                  </a:txBody>
+                  <a:tcPr/>
+                </a:tc>
+                <a:tc>
+                  <a:txBody>
+                    <a:bodyPr/>
+                    <a:lstStyle/>
+                    <a:p>
+                      <a:r>
+                        <a:rPr lang="en-US" dirty="0"/>
+                        <a:t>Serial</a:t>
+                      </a:r>
+                    </a:p>
+                  </a:txBody>
+                  <a:tcPr/>
+                </a:tc>
+                <a:tc>
+                  <a:txBody>
+                    <a:bodyPr/>
+                    <a:lstStyle/>
+                    <a:p>
+                      <a:r>
+                        <a:rPr lang="en-US" dirty="0"/>
+                        <a:t>Timestamp</a:t>
+                      </a:r>
+                    </a:p>
+                  </a:txBody>
+                  <a:tcPr/>
+                </a:tc>
+                <a:tc>
+                  <a:txBody>
+                    <a:bodyPr/>
+                    <a:lstStyle/>
+                    <a:p>
+                      <a:r>
+                        <a:rPr lang="en-US" dirty="0"/>
+                        <a:t>Ack</a:t>
+                      </a:r>
+                    </a:p>
+                  </a:txBody>
+                  <a:tcPr/>
+                </a:tc>
+                <a:tc>
+                  <a:txBody>
+                    <a:bodyPr/>
+                    <a:lstStyle/>
+                    <a:p>
+                      <a:r>
+                        <a:rPr lang="en-US" dirty="0"/>
+                        <a:t>Fetched</a:t>
+                      </a:r>
+                    </a:p>
+                  </a:txBody>
+                  <a:tcPr/>
+                </a:tc>
+                <a:tc>
+                  <a:txBody>
+                    <a:bodyPr/>
+                    <a:lstStyle/>
+                    <a:p>
+                      <a:r>
+                        <a:rPr lang="en-US" dirty="0"/>
+                        <a:t>Token</a:t>
+                      </a:r>
+                    </a:p>
+                  </a:txBody>
+                  <a:tcPr/>
+                </a:tc>
+                <a:extLst>
+                  <a:ext uri="{0D108BD9-81ED-4DB2-BD59-A6C34878D82A}">
+                    <a16:rowId xmlns:a16="http://schemas.microsoft.com/office/drawing/2014/main" val="4240309834"/>
+                  </a:ext>
+                </a:extLst>
+              </a:tr>
+              <a:tr h="370840">
+                <a:tc>
+                  <a:txBody>
+                    <a:bodyPr/>
+                    <a:lstStyle/>
+                    <a:p>
+                      <a:endParaRPr lang="en-US" dirty="0"/>
+                    </a:p>
+                  </a:txBody>
+                  <a:tcPr/>
+                </a:tc>
+                <a:tc>
+                  <a:txBody>
+                    <a:bodyPr/>
+                    <a:lstStyle/>
+                    <a:p>
+                      <a:endParaRPr lang="en-US"/>
+                    </a:p>
+                  </a:txBody>
+                  <a:tcPr/>
+                </a:tc>
+                <a:tc>
+                  <a:txBody>
+                    <a:bodyPr/>
+                    <a:lstStyle/>
+                    <a:p>
+                      <a:endParaRPr lang="en-US" dirty="0"/>
+                    </a:p>
+                  </a:txBody>
+                  <a:tcPr/>
+                </a:tc>
+                <a:tc>
+                  <a:txBody>
+                    <a:bodyPr/>
+                    <a:lstStyle/>
+                    <a:p>
+                      <a:endParaRPr lang="en-US" dirty="0"/>
+                    </a:p>
+                  </a:txBody>
+                  <a:tcPr/>
+                </a:tc>
+                <a:tc>
+                  <a:txBody>
+                    <a:bodyPr/>
+                    <a:lstStyle/>
+                    <a:p>
+                      <a:endParaRPr lang="en-US"/>
+                    </a:p>
+                  </a:txBody>
+                  <a:tcPr/>
+                </a:tc>
+                <a:tc>
+                  <a:txBody>
+                    <a:bodyPr/>
+                    <a:lstStyle/>
+                    <a:p>
+                      <a:endParaRPr lang="en-US" dirty="0"/>
+                    </a:p>
+                  </a:txBody>
+                  <a:tcPr/>
+                </a:tc>
+                <a:extLst>
+                  <a:ext uri="{0D108BD9-81ED-4DB2-BD59-A6C34878D82A}">
+                    <a16:rowId xmlns:a16="http://schemas.microsoft.com/office/drawing/2014/main" val="822233981"/>
+                  </a:ext>
+                </a:extLst>
+              </a:tr>
+            </a:tbl>
+          </a:graphicData>
+        </a:graphic>
+      </p:graphicFrame>
+      <p:graphicFrame>
+        <p:nvGraphicFramePr>
+          <p:cNvPr id="5" name="Table 4">
+            <a:extLst>
+              <a:ext uri="{FF2B5EF4-FFF2-40B4-BE49-F238E27FC236}">
+                <a16:creationId xmlns:a16="http://schemas.microsoft.com/office/drawing/2014/main" id="{1D6D2D9C-AA6E-4549-B1FD-7F6532997B7E}"/>
+              </a:ext>
+            </a:extLst>
+          </p:cNvPr>
+          <p:cNvGraphicFramePr>
+            <a:graphicFrameLocks noGrp="1"/>
+          </p:cNvGraphicFramePr>
+          <p:nvPr>
+            <p:extLst>
+              <p:ext uri="{D42A27DB-BD31-4B8C-83A1-F6EECF244321}">
+                <p14:modId xmlns:p14="http://schemas.microsoft.com/office/powerpoint/2010/main" val="3216622460"/>
+              </p:ext>
+            </p:extLst>
+          </p:nvPr>
+        </p:nvGraphicFramePr>
+        <p:xfrm>
+          <a:off x="1040597" y="1845822"/>
+          <a:ext cx="6502400" cy="741680"/>
+        </p:xfrm>
+        <a:graphic>
+          <a:graphicData uri="http://schemas.openxmlformats.org/drawingml/2006/table">
+            <a:tbl>
+              <a:tblPr firstRow="1" bandRow="1">
+                <a:tableStyleId>{93296810-A885-4BE3-A3E7-6D5BEEA58F35}</a:tableStyleId>
+              </a:tblPr>
+              <a:tblGrid>
+                <a:gridCol w="1625600">
+                  <a:extLst>
+                    <a:ext uri="{9D8B030D-6E8A-4147-A177-3AD203B41FA5}">
+                      <a16:colId xmlns:a16="http://schemas.microsoft.com/office/drawing/2014/main" val="2917954857"/>
+                    </a:ext>
+                  </a:extLst>
+                </a:gridCol>
+                <a:gridCol w="1625600">
+                  <a:extLst>
+                    <a:ext uri="{9D8B030D-6E8A-4147-A177-3AD203B41FA5}">
+                      <a16:colId xmlns:a16="http://schemas.microsoft.com/office/drawing/2014/main" val="410468050"/>
+                    </a:ext>
+                  </a:extLst>
+                </a:gridCol>
+                <a:gridCol w="1625600">
+                  <a:extLst>
+                    <a:ext uri="{9D8B030D-6E8A-4147-A177-3AD203B41FA5}">
+                      <a16:colId xmlns:a16="http://schemas.microsoft.com/office/drawing/2014/main" val="2110324396"/>
+                    </a:ext>
+                  </a:extLst>
+                </a:gridCol>
+                <a:gridCol w="1625600">
+                  <a:extLst>
+                    <a:ext uri="{9D8B030D-6E8A-4147-A177-3AD203B41FA5}">
+                      <a16:colId xmlns:a16="http://schemas.microsoft.com/office/drawing/2014/main" val="1289152925"/>
+                    </a:ext>
+                  </a:extLst>
+                </a:gridCol>
+              </a:tblGrid>
+              <a:tr h="370840">
+                <a:tc>
+                  <a:txBody>
+                    <a:bodyPr/>
+                    <a:lstStyle/>
+                    <a:p>
+                      <a:r>
+                        <a:rPr lang="en-US" dirty="0"/>
+                        <a:t>Timestamp</a:t>
+                      </a:r>
+                    </a:p>
+                  </a:txBody>
+                  <a:tcPr/>
+                </a:tc>
+                <a:tc>
+                  <a:txBody>
+                    <a:bodyPr/>
+                    <a:lstStyle/>
+                    <a:p>
+                      <a:r>
+                        <a:rPr lang="en-US" dirty="0"/>
+                        <a:t>Serial</a:t>
+                      </a:r>
+                    </a:p>
+                  </a:txBody>
+                  <a:tcPr/>
+                </a:tc>
+                <a:tc>
+                  <a:txBody>
+                    <a:bodyPr/>
+                    <a:lstStyle/>
+                    <a:p>
+                      <a:r>
+                        <a:rPr lang="en-US" dirty="0"/>
+                        <a:t>Payload</a:t>
+                      </a:r>
+                    </a:p>
+                  </a:txBody>
+                  <a:tcPr/>
+                </a:tc>
+                <a:tc>
+                  <a:txBody>
+                    <a:bodyPr/>
+                    <a:lstStyle/>
+                    <a:p>
+                      <a:r>
+                        <a:rPr lang="en-US" dirty="0"/>
+                        <a:t>Cursor-Id</a:t>
+                      </a:r>
+                    </a:p>
+                  </a:txBody>
+                  <a:tcPr/>
+                </a:tc>
+                <a:extLst>
+                  <a:ext uri="{0D108BD9-81ED-4DB2-BD59-A6C34878D82A}">
+                    <a16:rowId xmlns:a16="http://schemas.microsoft.com/office/drawing/2014/main" val="3603719663"/>
+                  </a:ext>
+                </a:extLst>
+              </a:tr>
+              <a:tr h="370840">
+                <a:tc>
+                  <a:txBody>
+                    <a:bodyPr/>
+                    <a:lstStyle/>
+                    <a:p>
+                      <a:endParaRPr lang="en-US" dirty="0"/>
+                    </a:p>
+                  </a:txBody>
+                  <a:tcPr/>
+                </a:tc>
+                <a:tc>
+                  <a:txBody>
+                    <a:bodyPr/>
+                    <a:lstStyle/>
+                    <a:p>
+                      <a:endParaRPr lang="en-US"/>
+                    </a:p>
+                  </a:txBody>
+                  <a:tcPr/>
+                </a:tc>
+                <a:tc>
+                  <a:txBody>
+                    <a:bodyPr/>
+                    <a:lstStyle/>
+                    <a:p>
+                      <a:endParaRPr lang="en-US"/>
+                    </a:p>
+                  </a:txBody>
+                  <a:tcPr/>
+                </a:tc>
+                <a:tc>
+                  <a:txBody>
+                    <a:bodyPr/>
+                    <a:lstStyle/>
+                    <a:p>
+                      <a:endParaRPr lang="en-US" dirty="0"/>
+                    </a:p>
+                  </a:txBody>
+                  <a:tcPr/>
+                </a:tc>
+                <a:extLst>
+                  <a:ext uri="{0D108BD9-81ED-4DB2-BD59-A6C34878D82A}">
+                    <a16:rowId xmlns:a16="http://schemas.microsoft.com/office/drawing/2014/main" val="470915959"/>
+                  </a:ext>
+                </a:extLst>
+              </a:tr>
+            </a:tbl>
+          </a:graphicData>
+        </a:graphic>
+      </p:graphicFrame>
+      <p:sp>
+        <p:nvSpPr>
+          <p:cNvPr id="6" name="TextBox 5">
+            <a:extLst>
+              <a:ext uri="{FF2B5EF4-FFF2-40B4-BE49-F238E27FC236}">
+                <a16:creationId xmlns:a16="http://schemas.microsoft.com/office/drawing/2014/main" id="{E88486DD-1513-BE42-A158-92ED4A805809}"/>
+              </a:ext>
+            </a:extLst>
+          </p:cNvPr>
+          <p:cNvSpPr txBox="1"/>
+          <p:nvPr/>
+        </p:nvSpPr>
+        <p:spPr>
+          <a:xfrm>
+            <a:off x="1040597" y="1471911"/>
+            <a:ext cx="1380121" cy="369332"/>
+          </a:xfrm>
+          <a:prstGeom prst="rect">
+            <a:avLst/>
+          </a:prstGeom>
+          <a:noFill/>
+        </p:spPr>
+        <p:txBody>
+          <a:bodyPr wrap="none" rtlCol="0">
+            <a:spAutoFit/>
+          </a:bodyPr>
+          <a:lstStyle/>
+          <a:p>
+            <a:r>
+              <a:rPr lang="en-US" dirty="0"/>
+              <a:t>Queue-Table</a:t>
+            </a:r>
+          </a:p>
+        </p:txBody>
+      </p:sp>
+      <p:sp>
+        <p:nvSpPr>
+          <p:cNvPr id="7" name="TextBox 6">
+            <a:extLst>
+              <a:ext uri="{FF2B5EF4-FFF2-40B4-BE49-F238E27FC236}">
+                <a16:creationId xmlns:a16="http://schemas.microsoft.com/office/drawing/2014/main" id="{ED74E1E6-DC13-154E-8856-A597DF7CA0DB}"/>
+              </a:ext>
+            </a:extLst>
+          </p:cNvPr>
+          <p:cNvSpPr txBox="1"/>
+          <p:nvPr/>
+        </p:nvSpPr>
+        <p:spPr>
+          <a:xfrm>
+            <a:off x="997248" y="2939435"/>
+            <a:ext cx="1356590" cy="369332"/>
+          </a:xfrm>
+          <a:prstGeom prst="rect">
+            <a:avLst/>
+          </a:prstGeom>
+          <a:noFill/>
+        </p:spPr>
+        <p:txBody>
+          <a:bodyPr wrap="none" rtlCol="0">
+            <a:spAutoFit/>
+          </a:bodyPr>
+          <a:lstStyle/>
+          <a:p>
+            <a:r>
+              <a:rPr lang="en-US" dirty="0"/>
+              <a:t>Cursor-Table</a:t>
+            </a:r>
+          </a:p>
+        </p:txBody>
+      </p:sp>
+      <p:sp>
+        <p:nvSpPr>
+          <p:cNvPr id="8" name="TextBox 7">
+            <a:extLst>
+              <a:ext uri="{FF2B5EF4-FFF2-40B4-BE49-F238E27FC236}">
+                <a16:creationId xmlns:a16="http://schemas.microsoft.com/office/drawing/2014/main" id="{D2296905-36DE-894A-BE26-3B81872EBC95}"/>
+              </a:ext>
+            </a:extLst>
+          </p:cNvPr>
+          <p:cNvSpPr txBox="1"/>
+          <p:nvPr/>
+        </p:nvSpPr>
+        <p:spPr>
+          <a:xfrm>
+            <a:off x="964021" y="4414554"/>
+            <a:ext cx="4247317" cy="369332"/>
+          </a:xfrm>
+          <a:prstGeom prst="rect">
+            <a:avLst/>
+          </a:prstGeom>
+          <a:noFill/>
+        </p:spPr>
+        <p:txBody>
+          <a:bodyPr wrap="none" rtlCol="0">
+            <a:spAutoFit/>
+          </a:bodyPr>
+          <a:lstStyle/>
+          <a:p>
+            <a:r>
+              <a:rPr lang="en-US" dirty="0"/>
+              <a:t>Intelligent up-</a:t>
+            </a:r>
+            <a:r>
+              <a:rPr lang="en-US" dirty="0" err="1"/>
+              <a:t>sert</a:t>
+            </a:r>
+            <a:r>
+              <a:rPr lang="en-US" dirty="0"/>
+              <a:t> with serialize transaction</a:t>
+            </a:r>
+          </a:p>
+        </p:txBody>
+      </p:sp>
+    </p:spTree>
+    <p:extLst>
+      <p:ext uri="{BB962C8B-B14F-4D97-AF65-F5344CB8AC3E}">
+        <p14:creationId xmlns:p14="http://schemas.microsoft.com/office/powerpoint/2010/main" val="1569776287"/>
+      </p:ext>
+    </p:extLst>
+  </p:cSld>
+  <p:clrMapOvr>
+    <a:masterClrMapping/>
+  </p:clrMapOvr>
+</p:sld>
+</file>
+
+<file path=ppt/slides/slide6.xml><?xml version="1.0" encoding="utf-8"?>
+<p:sld xmlns:a="http://schemas.openxmlformats.org/drawingml/2006/main" xmlns:r="http://schemas.openxmlformats.org/officeDocument/2006/relationships" xmlns:p="http://schemas.openxmlformats.org/presentationml/2006/main">
+  <p:cSld>
+    <p:spTree>
+      <p:nvGrpSpPr>
+        <p:cNvPr id="1" name=""/>
+        <p:cNvGrpSpPr/>
+        <p:nvPr/>
+      </p:nvGrpSpPr>
+      <p:grpSpPr>
+        <a:xfrm>
+          <a:off x="0" y="0"/>
+          <a:ext cx="0" cy="0"/>
+          <a:chOff x="0" y="0"/>
+          <a:chExt cx="0" cy="0"/>
+        </a:xfrm>
+      </p:grpSpPr>
+      <p:sp>
+        <p:nvSpPr>
           <p:cNvPr id="4" name="Rectangle 3">
             <a:extLst>
               <a:ext uri="{FF2B5EF4-FFF2-40B4-BE49-F238E27FC236}">

</xml_diff>

<commit_message>
Moved connection outside of the library, and more restrictive lock
</commit_message>
<xml_diff>
--- a/docs/Modes.pptx
+++ b/docs/Modes.pptx
@@ -264,7 +264,7 @@
           <a:p>
             <a:fld id="{B1D224DC-7A03-894A-9BE6-0422F4EAB7F2}" type="datetimeFigureOut">
               <a:rPr lang="en-US" smtClean="0"/>
-              <a:t>10/6/20</a:t>
+              <a:t>10/7/20</a:t>
             </a:fld>
             <a:endParaRPr lang="en-US"/>
           </a:p>
@@ -462,7 +462,7 @@
           <a:p>
             <a:fld id="{B1D224DC-7A03-894A-9BE6-0422F4EAB7F2}" type="datetimeFigureOut">
               <a:rPr lang="en-US" smtClean="0"/>
-              <a:t>10/6/20</a:t>
+              <a:t>10/7/20</a:t>
             </a:fld>
             <a:endParaRPr lang="en-US"/>
           </a:p>
@@ -670,7 +670,7 @@
           <a:p>
             <a:fld id="{B1D224DC-7A03-894A-9BE6-0422F4EAB7F2}" type="datetimeFigureOut">
               <a:rPr lang="en-US" smtClean="0"/>
-              <a:t>10/6/20</a:t>
+              <a:t>10/7/20</a:t>
             </a:fld>
             <a:endParaRPr lang="en-US"/>
           </a:p>
@@ -868,7 +868,7 @@
           <a:p>
             <a:fld id="{B1D224DC-7A03-894A-9BE6-0422F4EAB7F2}" type="datetimeFigureOut">
               <a:rPr lang="en-US" smtClean="0"/>
-              <a:t>10/6/20</a:t>
+              <a:t>10/7/20</a:t>
             </a:fld>
             <a:endParaRPr lang="en-US"/>
           </a:p>
@@ -1143,7 +1143,7 @@
           <a:p>
             <a:fld id="{B1D224DC-7A03-894A-9BE6-0422F4EAB7F2}" type="datetimeFigureOut">
               <a:rPr lang="en-US" smtClean="0"/>
-              <a:t>10/6/20</a:t>
+              <a:t>10/7/20</a:t>
             </a:fld>
             <a:endParaRPr lang="en-US"/>
           </a:p>
@@ -1408,7 +1408,7 @@
           <a:p>
             <a:fld id="{B1D224DC-7A03-894A-9BE6-0422F4EAB7F2}" type="datetimeFigureOut">
               <a:rPr lang="en-US" smtClean="0"/>
-              <a:t>10/6/20</a:t>
+              <a:t>10/7/20</a:t>
             </a:fld>
             <a:endParaRPr lang="en-US"/>
           </a:p>
@@ -1820,7 +1820,7 @@
           <a:p>
             <a:fld id="{B1D224DC-7A03-894A-9BE6-0422F4EAB7F2}" type="datetimeFigureOut">
               <a:rPr lang="en-US" smtClean="0"/>
-              <a:t>10/6/20</a:t>
+              <a:t>10/7/20</a:t>
             </a:fld>
             <a:endParaRPr lang="en-US"/>
           </a:p>
@@ -1961,7 +1961,7 @@
           <a:p>
             <a:fld id="{B1D224DC-7A03-894A-9BE6-0422F4EAB7F2}" type="datetimeFigureOut">
               <a:rPr lang="en-US" smtClean="0"/>
-              <a:t>10/6/20</a:t>
+              <a:t>10/7/20</a:t>
             </a:fld>
             <a:endParaRPr lang="en-US"/>
           </a:p>
@@ -2074,7 +2074,7 @@
           <a:p>
             <a:fld id="{B1D224DC-7A03-894A-9BE6-0422F4EAB7F2}" type="datetimeFigureOut">
               <a:rPr lang="en-US" smtClean="0"/>
-              <a:t>10/6/20</a:t>
+              <a:t>10/7/20</a:t>
             </a:fld>
             <a:endParaRPr lang="en-US"/>
           </a:p>
@@ -2385,7 +2385,7 @@
           <a:p>
             <a:fld id="{B1D224DC-7A03-894A-9BE6-0422F4EAB7F2}" type="datetimeFigureOut">
               <a:rPr lang="en-US" smtClean="0"/>
-              <a:t>10/6/20</a:t>
+              <a:t>10/7/20</a:t>
             </a:fld>
             <a:endParaRPr lang="en-US"/>
           </a:p>
@@ -2673,7 +2673,7 @@
           <a:p>
             <a:fld id="{B1D224DC-7A03-894A-9BE6-0422F4EAB7F2}" type="datetimeFigureOut">
               <a:rPr lang="en-US" smtClean="0"/>
-              <a:t>10/6/20</a:t>
+              <a:t>10/7/20</a:t>
             </a:fld>
             <a:endParaRPr lang="en-US"/>
           </a:p>
@@ -2914,7 +2914,7 @@
           <a:p>
             <a:fld id="{B1D224DC-7A03-894A-9BE6-0422F4EAB7F2}" type="datetimeFigureOut">
               <a:rPr lang="en-US" smtClean="0"/>
-              <a:t>10/6/20</a:t>
+              <a:t>10/7/20</a:t>
             </a:fld>
             <a:endParaRPr lang="en-US"/>
           </a:p>
@@ -4722,7 +4722,7 @@
                     <a:bodyPr/>
                     <a:lstStyle/>
                     <a:p>
-                      <a:endParaRPr lang="en-US"/>
+                      <a:endParaRPr lang="en-US" dirty="0"/>
                     </a:p>
                   </a:txBody>
                   <a:tcPr/>
@@ -5056,6 +5056,85 @@
             <a:r>
               <a:rPr lang="en-US" dirty="0"/>
               <a:t> with serialize transaction</a:t>
+            </a:r>
+          </a:p>
+        </p:txBody>
+      </p:sp>
+      <p:sp>
+        <p:nvSpPr>
+          <p:cNvPr id="3" name="TextBox 2">
+            <a:extLst>
+              <a:ext uri="{FF2B5EF4-FFF2-40B4-BE49-F238E27FC236}">
+                <a16:creationId xmlns:a16="http://schemas.microsoft.com/office/drawing/2014/main" id="{E91C85FF-E7AC-0F4F-932B-60070A5B882C}"/>
+              </a:ext>
+            </a:extLst>
+          </p:cNvPr>
+          <p:cNvSpPr txBox="1"/>
+          <p:nvPr/>
+        </p:nvSpPr>
+        <p:spPr>
+          <a:xfrm>
+            <a:off x="3763478" y="5043638"/>
+            <a:ext cx="2567306" cy="1477328"/>
+          </a:xfrm>
+          <a:prstGeom prst="rect">
+            <a:avLst/>
+          </a:prstGeom>
+          <a:noFill/>
+        </p:spPr>
+        <p:txBody>
+          <a:bodyPr wrap="none" rtlCol="0">
+            <a:spAutoFit/>
+          </a:bodyPr>
+          <a:lstStyle/>
+          <a:p>
+            <a:pPr marL="342900" indent="-342900">
+              <a:buFont typeface="+mj-lt"/>
+              <a:buAutoNum type="arabicPeriod"/>
+            </a:pPr>
+            <a:r>
+              <a:rPr lang="en-US" dirty="0"/>
+              <a:t>Speed</a:t>
+            </a:r>
+          </a:p>
+          <a:p>
+            <a:pPr marL="342900" indent="-342900">
+              <a:buFont typeface="+mj-lt"/>
+              <a:buAutoNum type="arabicPeriod"/>
+            </a:pPr>
+            <a:r>
+              <a:rPr lang="en-US" dirty="0"/>
+              <a:t>UI for Que</a:t>
+            </a:r>
+          </a:p>
+          <a:p>
+            <a:pPr marL="342900" indent="-342900">
+              <a:buFont typeface="+mj-lt"/>
+              <a:buAutoNum type="arabicPeriod"/>
+            </a:pPr>
+            <a:r>
+              <a:rPr lang="en-US" dirty="0"/>
+              <a:t>Logic </a:t>
+            </a:r>
+          </a:p>
+          <a:p>
+            <a:pPr marL="342900" indent="-342900">
+              <a:buFont typeface="+mj-lt"/>
+              <a:buAutoNum type="arabicPeriod"/>
+            </a:pPr>
+            <a:r>
+              <a:rPr lang="en-US" dirty="0"/>
+              <a:t>Deployment is known</a:t>
+            </a:r>
+          </a:p>
+          <a:p>
+            <a:pPr marL="342900" indent="-342900">
+              <a:buFont typeface="+mj-lt"/>
+              <a:buAutoNum type="arabicPeriod"/>
+            </a:pPr>
+            <a:r>
+              <a:rPr lang="en-US" dirty="0"/>
+              <a:t>Experience </a:t>
             </a:r>
           </a:p>
         </p:txBody>

</xml_diff>